<commit_message>
added Ben Shultze picture
</commit_message>
<xml_diff>
--- a/Slides/Lesson 1.1 Course Introduction.pptx
+++ b/Slides/Lesson 1.1 Course Introduction.pptx
@@ -8275,7 +8275,12 @@
             <p:ph type="sldNum" sz="quarter" idx="12"/>
           </p:nvPr>
         </p:nvSpPr>
-        <p:spPr/>
+        <p:spPr>
+          <a:xfrm>
+            <a:off x="8385517" y="6356350"/>
+            <a:ext cx="2743200" cy="365125"/>
+          </a:xfrm>
+        </p:spPr>
         <p:txBody>
           <a:bodyPr/>
           <a:lstStyle/>
@@ -8336,7 +8341,7 @@
           </a:ln>
           <a:extLst>
             <a:ext uri="{C572A759-6A51-4108-AA02-DFA0A04FC94B}">
-              <ma14:wrappingTextBoxFlag xmlns:ma14="http://schemas.microsoft.com/office/mac/drawingml/2011/main" xmlns:a14="http://schemas.microsoft.com/office/drawing/2010/main" xmlns:m="http://schemas.openxmlformats.org/officeDocument/2006/math" xmlns="" val="1"/>
+              <ma14:wrappingTextBoxFlag xmlns="" xmlns:m="http://schemas.openxmlformats.org/officeDocument/2006/math" xmlns:a14="http://schemas.microsoft.com/office/drawing/2010/main" xmlns:ma14="http://schemas.microsoft.com/office/mac/drawingml/2011/main" val="1"/>
             </a:ext>
           </a:extLst>
         </p:spPr>
@@ -8373,7 +8378,7 @@
           </a:ln>
           <a:extLst>
             <a:ext uri="{C572A759-6A51-4108-AA02-DFA0A04FC94B}">
-              <ma14:wrappingTextBoxFlag xmlns:ma14="http://schemas.microsoft.com/office/mac/drawingml/2011/main" xmlns:a14="http://schemas.microsoft.com/office/drawing/2010/main" xmlns:m="http://schemas.openxmlformats.org/officeDocument/2006/math" xmlns="" val="1"/>
+              <ma14:wrappingTextBoxFlag xmlns="" xmlns:m="http://schemas.openxmlformats.org/officeDocument/2006/math" xmlns:a14="http://schemas.microsoft.com/office/drawing/2010/main" xmlns:ma14="http://schemas.microsoft.com/office/mac/drawingml/2011/main" val="1"/>
             </a:ext>
           </a:extLst>
         </p:spPr>
@@ -8414,7 +8419,7 @@
           </a:ln>
           <a:extLst>
             <a:ext uri="{C572A759-6A51-4108-AA02-DFA0A04FC94B}">
-              <ma14:wrappingTextBoxFlag xmlns:ma14="http://schemas.microsoft.com/office/mac/drawingml/2011/main" xmlns:a14="http://schemas.microsoft.com/office/drawing/2010/main" xmlns:m="http://schemas.openxmlformats.org/officeDocument/2006/math" xmlns="" val="1"/>
+              <ma14:wrappingTextBoxFlag xmlns="" xmlns:m="http://schemas.openxmlformats.org/officeDocument/2006/math" xmlns:a14="http://schemas.microsoft.com/office/drawing/2010/main" xmlns:ma14="http://schemas.microsoft.com/office/mac/drawingml/2011/main" val="1"/>
             </a:ext>
           </a:extLst>
         </p:spPr>
@@ -8455,7 +8460,7 @@
           </a:ln>
           <a:extLst>
             <a:ext uri="{C572A759-6A51-4108-AA02-DFA0A04FC94B}">
-              <ma14:wrappingTextBoxFlag xmlns:ma14="http://schemas.microsoft.com/office/mac/drawingml/2011/main" xmlns:a14="http://schemas.microsoft.com/office/drawing/2010/main" xmlns:m="http://schemas.openxmlformats.org/officeDocument/2006/math" xmlns="" val="1"/>
+              <ma14:wrappingTextBoxFlag xmlns="" xmlns:m="http://schemas.openxmlformats.org/officeDocument/2006/math" xmlns:a14="http://schemas.microsoft.com/office/drawing/2010/main" xmlns:ma14="http://schemas.microsoft.com/office/mac/drawingml/2011/main" val="1"/>
             </a:ext>
           </a:extLst>
         </p:spPr>
@@ -8491,7 +8496,7 @@
           </a:ln>
           <a:extLst>
             <a:ext uri="{C572A759-6A51-4108-AA02-DFA0A04FC94B}">
-              <ma14:wrappingTextBoxFlag xmlns:ma14="http://schemas.microsoft.com/office/mac/drawingml/2011/main" xmlns:a14="http://schemas.microsoft.com/office/drawing/2010/main" xmlns:m="http://schemas.openxmlformats.org/officeDocument/2006/math" xmlns="" val="1"/>
+              <ma14:wrappingTextBoxFlag xmlns="" xmlns:m="http://schemas.openxmlformats.org/officeDocument/2006/math" xmlns:a14="http://schemas.microsoft.com/office/drawing/2010/main" xmlns:ma14="http://schemas.microsoft.com/office/mac/drawingml/2011/main" val="1"/>
             </a:ext>
           </a:extLst>
         </p:spPr>
@@ -8636,7 +8641,7 @@
         </p:blipFill>
         <p:spPr bwMode="auto">
           <a:xfrm>
-            <a:off x="7756894" y="1754613"/>
+            <a:off x="7531811" y="1754613"/>
             <a:ext cx="1990340" cy="1997064"/>
           </a:xfrm>
           <a:prstGeom prst="rect">
@@ -8683,7 +8688,7 @@
         </p:blipFill>
         <p:spPr bwMode="auto">
           <a:xfrm>
-            <a:off x="2983760" y="4426827"/>
+            <a:off x="2946566" y="4426827"/>
             <a:ext cx="2009775" cy="2009775"/>
           </a:xfrm>
           <a:prstGeom prst="rect">
@@ -8726,7 +8731,7 @@
           </a:ln>
           <a:extLst>
             <a:ext uri="{C572A759-6A51-4108-AA02-DFA0A04FC94B}">
-              <ma14:wrappingTextBoxFlag xmlns:ma14="http://schemas.microsoft.com/office/mac/drawingml/2011/main" xmlns:a14="http://schemas.microsoft.com/office/drawing/2010/main" xmlns:m="http://schemas.openxmlformats.org/officeDocument/2006/math" xmlns="" val="1"/>
+              <ma14:wrappingTextBoxFlag xmlns="" xmlns:m="http://schemas.openxmlformats.org/officeDocument/2006/math" xmlns:a14="http://schemas.microsoft.com/office/drawing/2010/main" xmlns:ma14="http://schemas.microsoft.com/office/mac/drawingml/2011/main" val="1"/>
             </a:ext>
           </a:extLst>
         </p:spPr>
@@ -8773,7 +8778,7 @@
           </a:ln>
           <a:extLst>
             <a:ext uri="{C572A759-6A51-4108-AA02-DFA0A04FC94B}">
-              <ma14:wrappingTextBoxFlag xmlns:ma14="http://schemas.microsoft.com/office/mac/drawingml/2011/main" xmlns:a14="http://schemas.microsoft.com/office/drawing/2010/main" xmlns:m="http://schemas.openxmlformats.org/officeDocument/2006/math" xmlns="" val="1"/>
+              <ma14:wrappingTextBoxFlag xmlns="" xmlns:m="http://schemas.openxmlformats.org/officeDocument/2006/math" xmlns:a14="http://schemas.microsoft.com/office/drawing/2010/main" xmlns:ma14="http://schemas.microsoft.com/office/mac/drawingml/2011/main" val="1"/>
             </a:ext>
           </a:extLst>
         </p:spPr>
@@ -8793,10 +8798,10 @@
       </p:sp>
       <p:pic>
         <p:nvPicPr>
-          <p:cNvPr id="4" name="Picture 3" descr="A picture containing clipart&#10;&#10;Description automatically generated">
-            <a:extLst>
-              <a:ext uri="{FF2B5EF4-FFF2-40B4-BE49-F238E27FC236}">
-                <a16:creationId xmlns:a16="http://schemas.microsoft.com/office/drawing/2014/main" id="{86642263-4B81-4145-9590-C74D9F792A96}"/>
+          <p:cNvPr id="5" name="Picture 4">
+            <a:extLst>
+              <a:ext uri="{FF2B5EF4-FFF2-40B4-BE49-F238E27FC236}">
+                <a16:creationId xmlns:a16="http://schemas.microsoft.com/office/drawing/2014/main" id="{3F19322F-C786-4D32-B4C9-6739D4C067E6}"/>
               </a:ext>
             </a:extLst>
           </p:cNvPr>
@@ -8805,25 +8810,21 @@
           </p:cNvPicPr>
           <p:nvPr/>
         </p:nvPicPr>
-        <p:blipFill>
+        <p:blipFill rotWithShape="1">
           <a:blip r:embed="rId8">
             <a:extLst>
               <a:ext uri="{28A0092B-C50C-407E-A947-70E740481C1C}">
                 <a14:useLocalDpi xmlns:a14="http://schemas.microsoft.com/office/drawing/2010/main" val="0"/>
               </a:ext>
-              <a:ext uri="{837473B0-CC2E-450A-ABE3-18F120FF3D39}">
-                <a1611:picAttrSrcUrl xmlns:a1611="http://schemas.microsoft.com/office/drawing/2016/11/main" r:id="rId9"/>
-              </a:ext>
             </a:extLst>
           </a:blip>
-          <a:stretch>
-            <a:fillRect/>
-          </a:stretch>
+          <a:srcRect l="19025" t="8228" r="6690" b="32674"/>
+          <a:stretch/>
         </p:blipFill>
         <p:spPr>
           <a:xfrm>
-            <a:off x="5487538" y="4669809"/>
-            <a:ext cx="1523810" cy="1523810"/>
+            <a:off x="5356383" y="4426827"/>
+            <a:ext cx="1887552" cy="2002230"/>
           </a:xfrm>
           <a:prstGeom prst="rect">
             <a:avLst/>

</xml_diff>

<commit_message>
fixed two typos in L1.1
</commit_message>
<xml_diff>
--- a/Slides/Lesson 1.1 Course Introduction.pptx
+++ b/Slides/Lesson 1.1 Course Introduction.pptx
@@ -5,17 +5,17 @@
     <p:sldMasterId id="2147483648" r:id="rId1"/>
   </p:sldMasterIdLst>
   <p:notesMasterIdLst>
-    <p:notesMasterId r:id="rId27"/>
+    <p:notesMasterId r:id="rId28"/>
   </p:notesMasterIdLst>
   <p:sldIdLst>
     <p:sldId id="256" r:id="rId2"/>
     <p:sldId id="283" r:id="rId3"/>
     <p:sldId id="259" r:id="rId4"/>
-    <p:sldId id="268" r:id="rId5"/>
-    <p:sldId id="302" r:id="rId6"/>
-    <p:sldId id="303" r:id="rId7"/>
-    <p:sldId id="291" r:id="rId8"/>
-    <p:sldId id="304" r:id="rId9"/>
+    <p:sldId id="303" r:id="rId5"/>
+    <p:sldId id="291" r:id="rId6"/>
+    <p:sldId id="304" r:id="rId7"/>
+    <p:sldId id="268" r:id="rId8"/>
+    <p:sldId id="302" r:id="rId9"/>
     <p:sldId id="300" r:id="rId10"/>
     <p:sldId id="271" r:id="rId11"/>
     <p:sldId id="292" r:id="rId12"/>
@@ -31,8 +31,9 @@
     <p:sldId id="280" r:id="rId22"/>
     <p:sldId id="297" r:id="rId23"/>
     <p:sldId id="306" r:id="rId24"/>
-    <p:sldId id="305" r:id="rId25"/>
-    <p:sldId id="298" r:id="rId26"/>
+    <p:sldId id="314" r:id="rId25"/>
+    <p:sldId id="305" r:id="rId26"/>
+    <p:sldId id="298" r:id="rId27"/>
   </p:sldIdLst>
   <p:sldSz cx="12192000" cy="6858000"/>
   <p:notesSz cx="6858000" cy="9144000"/>
@@ -221,7 +222,7 @@
           <a:p>
             <a:fld id="{7C7E5181-6CF5-45F7-A87A-E0E0B1FD7549}" type="datetimeFigureOut">
               <a:rPr lang="en-US" smtClean="0"/>
-              <a:t>1/13/2021</a:t>
+              <a:t>1/14/2021</a:t>
             </a:fld>
             <a:endParaRPr lang="en-US"/>
           </a:p>
@@ -785,7 +786,7 @@
           <a:p>
             <a:fld id="{5D2A64DE-480B-420F-9649-4F8E696E08E0}" type="datetime1">
               <a:rPr lang="en-US" smtClean="0"/>
-              <a:t>1/13/2021</a:t>
+              <a:t>1/14/2021</a:t>
             </a:fld>
             <a:endParaRPr lang="en-US"/>
           </a:p>
@@ -1019,7 +1020,7 @@
           <a:p>
             <a:fld id="{0D3616D0-8311-4107-9726-6B805E7D05BA}" type="datetime1">
               <a:rPr lang="en-US" smtClean="0"/>
-              <a:t>1/13/2021</a:t>
+              <a:t>1/14/2021</a:t>
             </a:fld>
             <a:endParaRPr lang="en-US"/>
           </a:p>
@@ -1227,7 +1228,7 @@
           <a:p>
             <a:fld id="{3BC2557A-5C88-417A-A763-5AC779462A5F}" type="datetime1">
               <a:rPr lang="en-US" smtClean="0"/>
-              <a:t>1/13/2021</a:t>
+              <a:t>1/14/2021</a:t>
             </a:fld>
             <a:endParaRPr lang="en-US"/>
           </a:p>
@@ -1751,7 +1752,7 @@
           <a:p>
             <a:fld id="{07C7BFD4-467E-4EDE-93EA-052F5B39A4E5}" type="datetime1">
               <a:rPr lang="en-US" smtClean="0"/>
-              <a:t>1/13/2021</a:t>
+              <a:t>1/14/2021</a:t>
             </a:fld>
             <a:endParaRPr lang="en-US"/>
           </a:p>
@@ -2064,7 +2065,7 @@
           <a:p>
             <a:fld id="{A533CBE2-D5BE-47AC-ADC2-9CDFC1D0CF90}" type="datetime1">
               <a:rPr lang="en-US" smtClean="0"/>
-              <a:t>1/13/2021</a:t>
+              <a:t>1/14/2021</a:t>
             </a:fld>
             <a:endParaRPr lang="en-US"/>
           </a:p>
@@ -2365,7 +2366,7 @@
           <a:p>
             <a:fld id="{39B7EDB1-CE74-4951-85A2-0B01C2128E28}" type="datetime1">
               <a:rPr lang="en-US" smtClean="0"/>
-              <a:t>1/13/2021</a:t>
+              <a:t>1/14/2021</a:t>
             </a:fld>
             <a:endParaRPr lang="en-US"/>
           </a:p>
@@ -2813,7 +2814,7 @@
           <a:p>
             <a:fld id="{2BC7EB92-A5C2-4807-A9DC-9EDE6CBFB241}" type="datetime1">
               <a:rPr lang="en-US" smtClean="0"/>
-              <a:t>1/13/2021</a:t>
+              <a:t>1/14/2021</a:t>
             </a:fld>
             <a:endParaRPr lang="en-US"/>
           </a:p>
@@ -2959,7 +2960,7 @@
           <a:p>
             <a:fld id="{109E55A0-C911-4F03-82FC-7E5926047D46}" type="datetime1">
               <a:rPr lang="en-US" smtClean="0"/>
-              <a:t>1/13/2021</a:t>
+              <a:t>1/14/2021</a:t>
             </a:fld>
             <a:endParaRPr lang="en-US"/>
           </a:p>
@@ -3108,7 +3109,7 @@
           <a:p>
             <a:fld id="{2B7B7EE0-7771-4CD5-9B2B-3550753A54A1}" type="datetime1">
               <a:rPr lang="en-US" smtClean="0"/>
-              <a:t>1/13/2021</a:t>
+              <a:t>1/14/2021</a:t>
             </a:fld>
             <a:endParaRPr lang="en-US"/>
           </a:p>
@@ -3419,7 +3420,7 @@
           <a:p>
             <a:fld id="{F8B318B3-0E87-4416-A9B8-D891968C2727}" type="datetime1">
               <a:rPr lang="en-US" smtClean="0"/>
-              <a:t>1/13/2021</a:t>
+              <a:t>1/14/2021</a:t>
             </a:fld>
             <a:endParaRPr lang="en-US"/>
           </a:p>
@@ -3707,7 +3708,7 @@
           <a:p>
             <a:fld id="{EA476A42-A091-4468-A075-64A31BE59948}" type="datetime1">
               <a:rPr lang="en-US" smtClean="0"/>
-              <a:t>1/13/2021</a:t>
+              <a:t>1/14/2021</a:t>
             </a:fld>
             <a:endParaRPr lang="en-US"/>
           </a:p>
@@ -3948,7 +3949,7 @@
           <a:p>
             <a:fld id="{54D997E8-DDEE-43F1-8D9B-F8A1E11DE488}" type="datetime1">
               <a:rPr lang="en-US" smtClean="0"/>
-              <a:t>1/13/2021</a:t>
+              <a:t>1/14/2021</a:t>
             </a:fld>
             <a:endParaRPr lang="en-US"/>
           </a:p>
@@ -4740,7 +4741,14 @@
             <a:pPr lvl="1"/>
             <a:r>
               <a:rPr lang="en-US" dirty="0"/>
-              <a:t>Lecture videos will be posted at start of week: watch videos before coming to class</a:t>
+              <a:t>Lecture videos will be posted at start of week: </a:t>
+            </a:r>
+          </a:p>
+          <a:p>
+            <a:pPr lvl="2"/>
+            <a:r>
+              <a:rPr lang="en-US" dirty="0"/>
+              <a:t>watch videos before coming to class</a:t>
             </a:r>
           </a:p>
           <a:p>
@@ -5093,13 +5101,14 @@
           </p:cNvPr>
           <p:cNvCxnSpPr>
             <a:cxnSpLocks/>
+            <a:stCxn id="9" idx="1"/>
           </p:cNvCxnSpPr>
           <p:nvPr/>
         </p:nvCxnSpPr>
         <p:spPr>
-          <a:xfrm flipH="1">
-            <a:off x="8610600" y="4368979"/>
-            <a:ext cx="1262851" cy="0"/>
+          <a:xfrm flipH="1" flipV="1">
+            <a:off x="8610601" y="4368979"/>
+            <a:ext cx="605456" cy="71024"/>
           </a:xfrm>
           <a:prstGeom prst="straightConnector1">
             <a:avLst/>
@@ -5144,7 +5153,7 @@
         <p:spPr>
           <a:xfrm>
             <a:off x="9216057" y="4181396"/>
-            <a:ext cx="2177511" cy="375166"/>
+            <a:ext cx="2628940" cy="517213"/>
           </a:xfrm>
           <a:prstGeom prst="rect">
             <a:avLst/>
@@ -5182,7 +5191,7 @@
           <a:lstStyle/>
           <a:p>
             <a:r>
-              <a:rPr lang="en-US" b="1" dirty="0">
+              <a:rPr lang="en-US" sz="2800" b="1" dirty="0">
                 <a:solidFill>
                   <a:schemeClr val="tx1"/>
                 </a:solidFill>
@@ -5439,7 +5448,7 @@
           <a:p>
             <a:r>
               <a:rPr lang="en-US" dirty="0"/>
-              <a:t>In this system, we will give a grade on each element of each assignment.</a:t>
+              <a:t>In this system, we will give a rating on each element of each assignment.</a:t>
             </a:r>
           </a:p>
           <a:p>
@@ -5586,7 +5595,7 @@
           <a:p>
             <a:r>
               <a:rPr lang="en-US" sz="2400" dirty="0"/>
-              <a:t>This is called "specification grading" because we will be a precise as we can to specify what is necessary for you to achieve each rating. </a:t>
+              <a:t>This is called "specification grading" because we will be as precise as we can to specify what is necessary for you to achieve each rating. </a:t>
             </a:r>
           </a:p>
           <a:p>
@@ -5644,7 +5653,7 @@
           <p:nvPr>
             <p:extLst>
               <p:ext uri="{D42A27DB-BD31-4B8C-83A1-F6EECF244321}">
-                <p14:modId xmlns:p14="http://schemas.microsoft.com/office/powerpoint/2010/main" val="2420618613"/>
+                <p14:modId xmlns:p14="http://schemas.microsoft.com/office/powerpoint/2010/main" val="2677435490"/>
               </p:ext>
             </p:extLst>
           </p:nvPr>
@@ -5697,7 +5706,7 @@
                     <a:p>
                       <a:r>
                         <a:rPr lang="en-US" dirty="0"/>
-                        <a:t>Weight</a:t>
+                        <a:t>Weight in Assignment</a:t>
                       </a:r>
                     </a:p>
                   </a:txBody>
@@ -7349,7 +7358,7 @@
             </a:r>
           </a:p>
           <a:p>
-            <a:pPr lvl="1"/>
+            <a:pPr lvl="2"/>
             <a:r>
               <a:rPr lang="en-US" dirty="0" err="1"/>
               <a:t>GradeScope</a:t>
@@ -7484,7 +7493,7 @@
             <a:pPr lvl="1"/>
             <a:r>
               <a:rPr lang="en-US" dirty="0"/>
-              <a:t>10% will be deducted for late HW assignments will turned in within 24 hours after the due date </a:t>
+              <a:t>10% will be deducted for late HW assignments turned in within 24 hours after the due date </a:t>
             </a:r>
           </a:p>
           <a:p>
@@ -7498,13 +7507,8 @@
             <a:pPr lvl="1"/>
             <a:r>
               <a:rPr lang="en-US" dirty="0"/>
-              <a:t>If you're worried about being busy around the time of a HW submission, please plan ahead and get started </a:t>
-            </a:r>
-            <a:r>
-              <a:rPr lang="en-US"/>
-              <a:t>early.</a:t>
-            </a:r>
-            <a:endParaRPr lang="en-US" dirty="0"/>
+              <a:t>If you're worried about being busy around the time of a HW submission, please plan ahead and get started early.</a:t>
+            </a:r>
           </a:p>
         </p:txBody>
       </p:sp>
@@ -7849,6 +7853,196 @@
           <p:cNvPr id="2" name="Title 1">
             <a:extLst>
               <a:ext uri="{FF2B5EF4-FFF2-40B4-BE49-F238E27FC236}">
+                <a16:creationId xmlns:a16="http://schemas.microsoft.com/office/drawing/2014/main" id="{1DD99648-CE8F-4E19-953E-8B3920440319}"/>
+              </a:ext>
+            </a:extLst>
+          </p:cNvPr>
+          <p:cNvSpPr>
+            <a:spLocks noGrp="1"/>
+          </p:cNvSpPr>
+          <p:nvPr>
+            <p:ph type="title"/>
+          </p:nvPr>
+        </p:nvSpPr>
+        <p:spPr/>
+        <p:txBody>
+          <a:bodyPr/>
+          <a:lstStyle/>
+          <a:p>
+            <a:r>
+              <a:rPr lang="en-US" dirty="0"/>
+              <a:t>Communication</a:t>
+            </a:r>
+          </a:p>
+        </p:txBody>
+      </p:sp>
+      <p:sp>
+        <p:nvSpPr>
+          <p:cNvPr id="3" name="Content Placeholder 2">
+            <a:extLst>
+              <a:ext uri="{FF2B5EF4-FFF2-40B4-BE49-F238E27FC236}">
+                <a16:creationId xmlns:a16="http://schemas.microsoft.com/office/drawing/2014/main" id="{82CC43D4-82B4-449F-8A4A-151724B1D9F3}"/>
+              </a:ext>
+            </a:extLst>
+          </p:cNvPr>
+          <p:cNvSpPr>
+            <a:spLocks noGrp="1"/>
+          </p:cNvSpPr>
+          <p:nvPr>
+            <p:ph idx="1"/>
+          </p:nvPr>
+        </p:nvSpPr>
+        <p:spPr/>
+        <p:txBody>
+          <a:bodyPr>
+            <a:normAutofit fontScale="92500" lnSpcReduction="10000"/>
+          </a:bodyPr>
+          <a:lstStyle/>
+          <a:p>
+            <a:r>
+              <a:rPr lang="en-US" dirty="0"/>
+              <a:t>Course web page (</a:t>
+            </a:r>
+            <a:r>
+              <a:rPr lang="en-US" dirty="0">
+                <a:hlinkClick r:id="rId2"/>
+              </a:rPr>
+              <a:t>https://neu-se.github.io/CS4530-CS5500-Spring-2021</a:t>
+            </a:r>
+            <a:r>
+              <a:rPr lang="en-US" dirty="0"/>
+              <a:t>)</a:t>
+            </a:r>
+          </a:p>
+          <a:p>
+            <a:r>
+              <a:rPr lang="en-US" dirty="0"/>
+              <a:t>Canvas</a:t>
+            </a:r>
+          </a:p>
+          <a:p>
+            <a:r>
+              <a:rPr lang="en-US" dirty="0"/>
+              <a:t>Piazza </a:t>
+            </a:r>
+          </a:p>
+          <a:p>
+            <a:pPr lvl="1"/>
+            <a:r>
+              <a:rPr lang="en-US" dirty="0"/>
+              <a:t>for questions about assignments, etc.</a:t>
+            </a:r>
+          </a:p>
+          <a:p>
+            <a:r>
+              <a:rPr lang="en-US" dirty="0"/>
+              <a:t>Slack (</a:t>
+            </a:r>
+            <a:r>
+              <a:rPr lang="en-US" dirty="0">
+                <a:hlinkClick r:id="rId3" action="ppaction://hlinkfile"/>
+              </a:rPr>
+              <a:t>nusespring2021.slack.com</a:t>
+            </a:r>
+            <a:r>
+              <a:rPr lang="en-US" dirty="0"/>
+              <a:t>)</a:t>
+            </a:r>
+          </a:p>
+          <a:p>
+            <a:pPr lvl="1"/>
+            <a:r>
+              <a:rPr lang="en-US" dirty="0"/>
+              <a:t>for more general discussions</a:t>
+            </a:r>
+          </a:p>
+          <a:p>
+            <a:pPr lvl="1"/>
+            <a:r>
+              <a:rPr lang="en-US" dirty="0"/>
+              <a:t># ta-office-hours</a:t>
+            </a:r>
+          </a:p>
+          <a:p>
+            <a:pPr lvl="1"/>
+            <a:r>
+              <a:rPr lang="en-US" dirty="0"/>
+              <a:t>knowledge-sharing (within the limits of the Academic Integrity Policy)</a:t>
+            </a:r>
+          </a:p>
+          <a:p>
+            <a:pPr lvl="1"/>
+            <a:r>
+              <a:rPr lang="en-US" dirty="0"/>
+              <a:t>whatever else you might want (within the limits of the Code of Student Conduct)</a:t>
+            </a:r>
+          </a:p>
+        </p:txBody>
+      </p:sp>
+      <p:sp>
+        <p:nvSpPr>
+          <p:cNvPr id="4" name="Slide Number Placeholder 3">
+            <a:extLst>
+              <a:ext uri="{FF2B5EF4-FFF2-40B4-BE49-F238E27FC236}">
+                <a16:creationId xmlns:a16="http://schemas.microsoft.com/office/drawing/2014/main" id="{66441BF3-B319-4719-9933-B7B7F3244E64}"/>
+              </a:ext>
+            </a:extLst>
+          </p:cNvPr>
+          <p:cNvSpPr>
+            <a:spLocks noGrp="1"/>
+          </p:cNvSpPr>
+          <p:nvPr>
+            <p:ph type="sldNum" sz="quarter" idx="12"/>
+          </p:nvPr>
+        </p:nvSpPr>
+        <p:spPr/>
+        <p:txBody>
+          <a:bodyPr/>
+          <a:lstStyle/>
+          <a:p>
+            <a:fld id="{20F37917-FD3A-4669-9018-DA04BCDD3D75}" type="slidenum">
+              <a:rPr lang="en-US" smtClean="0"/>
+              <a:t>24</a:t>
+            </a:fld>
+            <a:endParaRPr lang="en-US"/>
+          </a:p>
+        </p:txBody>
+      </p:sp>
+    </p:spTree>
+    <p:extLst>
+      <p:ext uri="{BB962C8B-B14F-4D97-AF65-F5344CB8AC3E}">
+        <p14:creationId xmlns:p14="http://schemas.microsoft.com/office/powerpoint/2010/main" val="2855917600"/>
+      </p:ext>
+    </p:extLst>
+  </p:cSld>
+  <p:clrMapOvr>
+    <a:masterClrMapping/>
+  </p:clrMapOvr>
+</p:sld>
+</file>
+
+<file path=ppt/slides/slide25.xml><?xml version="1.0" encoding="utf-8"?>
+<p:sld xmlns:a="http://schemas.openxmlformats.org/drawingml/2006/main" xmlns:r="http://schemas.openxmlformats.org/officeDocument/2006/relationships" xmlns:p="http://schemas.openxmlformats.org/presentationml/2006/main">
+  <p:cSld>
+    <p:spTree>
+      <p:nvGrpSpPr>
+        <p:cNvPr id="1" name=""/>
+        <p:cNvGrpSpPr/>
+        <p:nvPr/>
+      </p:nvGrpSpPr>
+      <p:grpSpPr>
+        <a:xfrm>
+          <a:off x="0" y="0"/>
+          <a:ext cx="0" cy="0"/>
+          <a:chOff x="0" y="0"/>
+          <a:chExt cx="0" cy="0"/>
+        </a:xfrm>
+      </p:grpSpPr>
+      <p:sp>
+        <p:nvSpPr>
+          <p:cNvPr id="2" name="Title 1">
+            <a:extLst>
+              <a:ext uri="{FF2B5EF4-FFF2-40B4-BE49-F238E27FC236}">
                 <a16:creationId xmlns:a16="http://schemas.microsoft.com/office/drawing/2014/main" id="{ADDDF7AD-1809-4173-85DB-C6679D1D1171}"/>
               </a:ext>
             </a:extLst>
@@ -7960,7 +8154,7 @@
               <a:pPr defTabSz="547695">
                 <a:defRPr/>
               </a:pPr>
-              <a:t>24</a:t>
+              <a:t>25</a:t>
             </a:fld>
             <a:endParaRPr lang="en-US"/>
           </a:p>
@@ -8043,7 +8237,7 @@
 </p:sld>
 </file>
 
-<file path=ppt/slides/slide25.xml><?xml version="1.0" encoding="utf-8"?>
+<file path=ppt/slides/slide26.xml><?xml version="1.0" encoding="utf-8"?>
 <p:sld xmlns:a="http://schemas.openxmlformats.org/drawingml/2006/main" xmlns:r="http://schemas.openxmlformats.org/officeDocument/2006/relationships" xmlns:p="http://schemas.openxmlformats.org/presentationml/2006/main">
   <p:cSld>
     <p:spTree>
@@ -8154,7 +8348,7 @@
               <a:pPr defTabSz="547695">
                 <a:defRPr/>
               </a:pPr>
-              <a:t>25</a:t>
+              <a:t>26</a:t>
             </a:fld>
             <a:endParaRPr lang="en-US"/>
           </a:p>
@@ -8408,7 +8602,7 @@
         </p:nvSpPr>
         <p:spPr>
           <a:xfrm>
-            <a:off x="8264397" y="3898296"/>
+            <a:off x="8139375" y="3898295"/>
             <a:ext cx="775212" cy="328295"/>
           </a:xfrm>
           <a:prstGeom prst="rect">
@@ -8720,7 +8914,7 @@
         </p:nvSpPr>
         <p:spPr>
           <a:xfrm>
-            <a:off x="5435545" y="3898296"/>
+            <a:off x="5716123" y="3898295"/>
             <a:ext cx="1066639" cy="328295"/>
           </a:xfrm>
           <a:prstGeom prst="rect">
@@ -8858,8 +9052,14 @@
       </p:grpSpPr>
       <p:sp>
         <p:nvSpPr>
-          <p:cNvPr id="203" name="CS 5500: Course Objective"/>
-          <p:cNvSpPr txBox="1">
+          <p:cNvPr id="2" name="Title 1">
+            <a:extLst>
+              <a:ext uri="{FF2B5EF4-FFF2-40B4-BE49-F238E27FC236}">
+                <a16:creationId xmlns:a16="http://schemas.microsoft.com/office/drawing/2014/main" id="{18ADC3A4-A4C7-4374-9D87-522BFF10B6D1}"/>
+              </a:ext>
+            </a:extLst>
+          </p:cNvPr>
+          <p:cNvSpPr>
             <a:spLocks noGrp="1"/>
           </p:cNvSpPr>
           <p:nvPr>
@@ -8869,31 +9069,25 @@
         <p:spPr/>
         <p:txBody>
           <a:bodyPr/>
-          <a:lstStyle>
-            <a:lvl1pPr>
-              <a:defRPr>
-                <a:solidFill>
-                  <a:srgbClr val="005493"/>
-                </a:solidFill>
-              </a:defRPr>
-            </a:lvl1pPr>
-          </a:lstStyle>
-          <a:p>
-            <a:r>
-              <a:rPr lang="en-US" dirty="0">
-                <a:solidFill>
-                  <a:srgbClr val="0070C0"/>
-                </a:solidFill>
-              </a:rPr>
-              <a:t>Learning Objectives for this course:</a:t>
-            </a:r>
-          </a:p>
-        </p:txBody>
-      </p:sp>
-      <p:sp>
-        <p:nvSpPr>
-          <p:cNvPr id="204" name="Developing skills that are necessary for successful software development…"/>
-          <p:cNvSpPr txBox="1">
+          <a:lstStyle/>
+          <a:p>
+            <a:r>
+              <a:rPr lang="en-US" dirty="0"/>
+              <a:t>What is software engineering?</a:t>
+            </a:r>
+          </a:p>
+        </p:txBody>
+      </p:sp>
+      <p:sp>
+        <p:nvSpPr>
+          <p:cNvPr id="3" name="Text Placeholder 2">
+            <a:extLst>
+              <a:ext uri="{FF2B5EF4-FFF2-40B4-BE49-F238E27FC236}">
+                <a16:creationId xmlns:a16="http://schemas.microsoft.com/office/drawing/2014/main" id="{9AF369B1-9D9C-4BA0-85DD-134DB71691FA}"/>
+              </a:ext>
+            </a:extLst>
+          </p:cNvPr>
+          <p:cNvSpPr>
             <a:spLocks noGrp="1"/>
           </p:cNvSpPr>
           <p:nvPr>
@@ -8909,46 +9103,27 @@
           <a:p>
             <a:r>
               <a:rPr lang="en-US" dirty="0"/>
-              <a:t>By the end of this course you will--</a:t>
-            </a:r>
-          </a:p>
-          <a:p>
-            <a:pPr lvl="1"/>
-            <a:r>
-              <a:rPr lang="en-US" dirty="0"/>
-              <a:t>Be able to define and describe the phases of the software engineering lifecycle.</a:t>
-            </a:r>
-          </a:p>
-          <a:p>
-            <a:pPr lvl="1"/>
-            <a:r>
-              <a:rPr lang="en-US" dirty="0"/>
-              <a:t>Be able to explain the role of key processes and technologies in modern software development.</a:t>
-            </a:r>
-          </a:p>
-          <a:p>
-            <a:pPr lvl="1"/>
-            <a:r>
-              <a:rPr lang="en-US" dirty="0"/>
-              <a:t>Be able to productively apply instances of major tools used in elementary SE tasks.</a:t>
-            </a:r>
-          </a:p>
-          <a:p>
-            <a:pPr lvl="1"/>
-            <a:r>
-              <a:rPr lang="en-US" dirty="0"/>
-              <a:t>Design and implement a portfolio-worthy software engineering project in a small team environment that can be showcased to recruiters.</a:t>
-            </a:r>
-          </a:p>
-          <a:p>
+              <a:t>Software Engineering encompasses the tools and processes that we use to design, construct and maintain programs over time. </a:t>
+            </a:r>
+          </a:p>
+          <a:p>
+            <a:pPr marL="0" indent="0">
+              <a:buNone/>
+            </a:pPr>
             <a:endParaRPr lang="en-US" dirty="0"/>
           </a:p>
         </p:txBody>
       </p:sp>
       <p:sp>
         <p:nvSpPr>
-          <p:cNvPr id="205" name="Slide Number"/>
-          <p:cNvSpPr txBox="1">
+          <p:cNvPr id="4" name="Slide Number Placeholder 3">
+            <a:extLst>
+              <a:ext uri="{FF2B5EF4-FFF2-40B4-BE49-F238E27FC236}">
+                <a16:creationId xmlns:a16="http://schemas.microsoft.com/office/drawing/2014/main" id="{FF3C775E-D48B-4F98-AF70-7A1D6E326F7C}"/>
+              </a:ext>
+            </a:extLst>
+          </p:cNvPr>
+          <p:cNvSpPr>
             <a:spLocks noGrp="1"/>
           </p:cNvSpPr>
           <p:nvPr>
@@ -8960,9 +9135,14 @@
           <a:bodyPr/>
           <a:lstStyle/>
           <a:p>
+            <a:pPr defTabSz="547695">
+              <a:defRPr/>
+            </a:pPr>
             <a:fld id="{86CB4B4D-7CA3-9044-876B-883B54F8677D}" type="slidenum">
-              <a:rPr lang="en-US"/>
-              <a:pPr/>
+              <a:rPr lang="en-US" smtClean="0"/>
+              <a:pPr defTabSz="547695">
+                <a:defRPr/>
+              </a:pPr>
               <a:t>4</a:t>
             </a:fld>
             <a:endParaRPr lang="en-US"/>
@@ -8970,6 +9150,11 @@
         </p:txBody>
       </p:sp>
     </p:spTree>
+    <p:extLst>
+      <p:ext uri="{BB962C8B-B14F-4D97-AF65-F5344CB8AC3E}">
+        <p14:creationId xmlns:p14="http://schemas.microsoft.com/office/powerpoint/2010/main" val="1713482684"/>
+      </p:ext>
+    </p:extLst>
   </p:cSld>
   <p:clrMapOvr>
     <a:masterClrMapping/>
@@ -8999,7 +9184,7 @@
           <p:cNvPr id="2" name="Title 1">
             <a:extLst>
               <a:ext uri="{FF2B5EF4-FFF2-40B4-BE49-F238E27FC236}">
-                <a16:creationId xmlns:a16="http://schemas.microsoft.com/office/drawing/2014/main" id="{B6D33575-0593-49FD-831F-131BB6CC7E6C}"/>
+                <a16:creationId xmlns:a16="http://schemas.microsoft.com/office/drawing/2014/main" id="{E23A9160-F1CD-46BE-8FA9-539DEA7A86A8}"/>
               </a:ext>
             </a:extLst>
           </p:cNvPr>
@@ -9017,7 +9202,7 @@
           <a:p>
             <a:r>
               <a:rPr lang="en-US" dirty="0"/>
-              <a:t>Learning Objectives for this Lesson</a:t>
+              <a:t>Good code is necessary but not sufficient</a:t>
             </a:r>
           </a:p>
         </p:txBody>
@@ -9027,7 +9212,7 @@
           <p:cNvPr id="3" name="Text Placeholder 2">
             <a:extLst>
               <a:ext uri="{FF2B5EF4-FFF2-40B4-BE49-F238E27FC236}">
-                <a16:creationId xmlns:a16="http://schemas.microsoft.com/office/drawing/2014/main" id="{5B21ECCD-9823-405F-AA9A-D0CC235AD583}"/>
+                <a16:creationId xmlns:a16="http://schemas.microsoft.com/office/drawing/2014/main" id="{9B785202-0527-4BED-9195-BD1721F90A93}"/>
               </a:ext>
             </a:extLst>
           </p:cNvPr>
@@ -9040,53 +9225,81 @@
         </p:nvSpPr>
         <p:spPr/>
         <p:txBody>
-          <a:bodyPr/>
-          <a:lstStyle/>
-          <a:p>
-            <a:r>
-              <a:rPr lang="en-US" dirty="0"/>
-              <a:t>By the end of this lesson you should be able to:</a:t>
+          <a:bodyPr>
+            <a:normAutofit/>
+          </a:bodyPr>
+          <a:lstStyle/>
+          <a:p>
+            <a:r>
+              <a:rPr lang="en-US" dirty="0"/>
+              <a:t>Developing software is a </a:t>
+            </a:r>
+            <a:r>
+              <a:rPr lang="en-US" b="1" i="1" dirty="0"/>
+              <a:t>systems enterprise</a:t>
             </a:r>
           </a:p>
           <a:p>
             <a:pPr lvl="1"/>
             <a:r>
               <a:rPr lang="en-US" dirty="0"/>
-              <a:t>Explain what SE is and why it’s important</a:t>
+              <a:t>there are many stakeholders</a:t>
             </a:r>
           </a:p>
           <a:p>
             <a:pPr lvl="1"/>
             <a:r>
               <a:rPr lang="en-US" dirty="0"/>
-              <a:t>List your weekly obligations as a student</a:t>
+              <a:t>how to determine the requirements?</a:t>
             </a:r>
           </a:p>
           <a:p>
             <a:pPr lvl="1"/>
             <a:r>
               <a:rPr lang="en-US" dirty="0"/>
-              <a:t>List the requirements for completing the course</a:t>
+              <a:t>how to design code for:</a:t>
+            </a:r>
+          </a:p>
+          <a:p>
+            <a:pPr lvl="2"/>
+            <a:r>
+              <a:rPr lang="en-US" dirty="0"/>
+              <a:t> reuse, readability, scale? other factors?</a:t>
             </a:r>
           </a:p>
           <a:p>
             <a:pPr lvl="1"/>
             <a:r>
               <a:rPr lang="en-US" dirty="0"/>
-              <a:t>Explain how assignments will be graded</a:t>
-            </a:r>
-          </a:p>
-          <a:p>
+              <a:t>how to organize the development process?</a:t>
+            </a:r>
+          </a:p>
+          <a:p>
+            <a:pPr lvl="1"/>
+            <a:r>
+              <a:rPr lang="en-US" dirty="0"/>
+              <a:t>how to make sure you've built the thing right?</a:t>
+            </a:r>
+          </a:p>
+          <a:p>
+            <a:pPr lvl="1"/>
+            <a:r>
+              <a:rPr lang="en-US" dirty="0"/>
+              <a:t>how to make sure you've built the right thing?</a:t>
+            </a:r>
+          </a:p>
+          <a:p>
+            <a:pPr lvl="1"/>
             <a:endParaRPr lang="en-US" dirty="0"/>
           </a:p>
         </p:txBody>
       </p:sp>
       <p:sp>
         <p:nvSpPr>
-          <p:cNvPr id="5" name="Slide Number Placeholder 4">
-            <a:extLst>
-              <a:ext uri="{FF2B5EF4-FFF2-40B4-BE49-F238E27FC236}">
-                <a16:creationId xmlns:a16="http://schemas.microsoft.com/office/drawing/2014/main" id="{D3CB1048-3EB8-4281-8361-E7EB70F6FBBC}"/>
+          <p:cNvPr id="4" name="Slide Number Placeholder 3">
+            <a:extLst>
+              <a:ext uri="{FF2B5EF4-FFF2-40B4-BE49-F238E27FC236}">
+                <a16:creationId xmlns:a16="http://schemas.microsoft.com/office/drawing/2014/main" id="{058D416C-4FDF-4DDB-B02D-6B36EF1E1AA4}"/>
               </a:ext>
             </a:extLst>
           </p:cNvPr>
@@ -9102,9 +9315,14 @@
           <a:bodyPr/>
           <a:lstStyle/>
           <a:p>
+            <a:pPr defTabSz="547695">
+              <a:defRPr/>
+            </a:pPr>
             <a:fld id="{86CB4B4D-7CA3-9044-876B-883B54F8677D}" type="slidenum">
               <a:rPr lang="en-US" smtClean="0"/>
-              <a:pPr/>
+              <a:pPr defTabSz="547695">
+                <a:defRPr/>
+              </a:pPr>
               <a:t>5</a:t>
             </a:fld>
             <a:endParaRPr lang="en-US"/>
@@ -9114,7 +9332,7 @@
     </p:spTree>
     <p:extLst>
       <p:ext uri="{BB962C8B-B14F-4D97-AF65-F5344CB8AC3E}">
-        <p14:creationId xmlns:p14="http://schemas.microsoft.com/office/powerpoint/2010/main" val="3915051007"/>
+        <p14:creationId xmlns:p14="http://schemas.microsoft.com/office/powerpoint/2010/main" val="1789365757"/>
       </p:ext>
     </p:extLst>
   </p:cSld>
@@ -9146,7 +9364,7 @@
           <p:cNvPr id="2" name="Title 1">
             <a:extLst>
               <a:ext uri="{FF2B5EF4-FFF2-40B4-BE49-F238E27FC236}">
-                <a16:creationId xmlns:a16="http://schemas.microsoft.com/office/drawing/2014/main" id="{18ADC3A4-A4C7-4374-9D87-522BFF10B6D1}"/>
+                <a16:creationId xmlns:a16="http://schemas.microsoft.com/office/drawing/2014/main" id="{E1A1CA2F-B830-4EF9-AABF-DC522F2572EF}"/>
               </a:ext>
             </a:extLst>
           </p:cNvPr>
@@ -9164,7 +9382,7 @@
           <a:p>
             <a:r>
               <a:rPr lang="en-US" dirty="0"/>
-              <a:t>What is software engineering?</a:t>
+              <a:t>SE includes Tools and Processes</a:t>
             </a:r>
           </a:p>
         </p:txBody>
@@ -9174,7 +9392,7 @@
           <p:cNvPr id="3" name="Text Placeholder 2">
             <a:extLst>
               <a:ext uri="{FF2B5EF4-FFF2-40B4-BE49-F238E27FC236}">
-                <a16:creationId xmlns:a16="http://schemas.microsoft.com/office/drawing/2014/main" id="{9AF369B1-9D9C-4BA0-85DD-134DB71691FA}"/>
+                <a16:creationId xmlns:a16="http://schemas.microsoft.com/office/drawing/2014/main" id="{1A2C1194-FA42-4E3A-A65B-A1165F11DFB1}"/>
               </a:ext>
             </a:extLst>
           </p:cNvPr>
@@ -9194,13 +9412,40 @@
           <a:p>
             <a:r>
               <a:rPr lang="en-US" dirty="0"/>
-              <a:t>Good code is necessary but not sufficient</a:t>
-            </a:r>
-          </a:p>
-          <a:p>
-            <a:r>
-              <a:rPr lang="en-US" dirty="0"/>
-              <a:t>Software Engineering encompasses the tools and processes that we use to design, construct and maintain programs over time. </a:t>
+              <a:t>The answers to those questions will depend on things like:</a:t>
+            </a:r>
+          </a:p>
+          <a:p>
+            <a:pPr lvl="1"/>
+            <a:r>
+              <a:rPr lang="en-US" dirty="0"/>
+              <a:t>the size of the team</a:t>
+            </a:r>
+          </a:p>
+          <a:p>
+            <a:pPr lvl="1"/>
+            <a:r>
+              <a:rPr lang="en-US" dirty="0"/>
+              <a:t>the size of the product</a:t>
+            </a:r>
+          </a:p>
+          <a:p>
+            <a:pPr lvl="1"/>
+            <a:r>
+              <a:rPr lang="en-US" dirty="0"/>
+              <a:t>the longevity of the product</a:t>
+            </a:r>
+          </a:p>
+          <a:p>
+            <a:r>
+              <a:rPr lang="en-US" dirty="0"/>
+              <a:t>There's no one "right" way; there are always tradeoffs.</a:t>
+            </a:r>
+          </a:p>
+          <a:p>
+            <a:r>
+              <a:rPr lang="en-US" dirty="0"/>
+              <a:t>But there are best practices, which we will expect you to follow.</a:t>
             </a:r>
           </a:p>
         </p:txBody>
@@ -9210,7 +9455,7 @@
           <p:cNvPr id="4" name="Slide Number Placeholder 3">
             <a:extLst>
               <a:ext uri="{FF2B5EF4-FFF2-40B4-BE49-F238E27FC236}">
-                <a16:creationId xmlns:a16="http://schemas.microsoft.com/office/drawing/2014/main" id="{FF3C775E-D48B-4F98-AF70-7A1D6E326F7C}"/>
+                <a16:creationId xmlns:a16="http://schemas.microsoft.com/office/drawing/2014/main" id="{A249E72F-16DC-4F27-A68F-C6A31919E455}"/>
               </a:ext>
             </a:extLst>
           </p:cNvPr>
@@ -9243,7 +9488,7 @@
     </p:spTree>
     <p:extLst>
       <p:ext uri="{BB962C8B-B14F-4D97-AF65-F5344CB8AC3E}">
-        <p14:creationId xmlns:p14="http://schemas.microsoft.com/office/powerpoint/2010/main" val="1713482684"/>
+        <p14:creationId xmlns:p14="http://schemas.microsoft.com/office/powerpoint/2010/main" val="1909338716"/>
       </p:ext>
     </p:extLst>
   </p:cSld>
@@ -9272,14 +9517,8 @@
       </p:grpSpPr>
       <p:sp>
         <p:nvSpPr>
-          <p:cNvPr id="2" name="Title 1">
-            <a:extLst>
-              <a:ext uri="{FF2B5EF4-FFF2-40B4-BE49-F238E27FC236}">
-                <a16:creationId xmlns:a16="http://schemas.microsoft.com/office/drawing/2014/main" id="{E23A9160-F1CD-46BE-8FA9-539DEA7A86A8}"/>
-              </a:ext>
-            </a:extLst>
-          </p:cNvPr>
-          <p:cNvSpPr>
+          <p:cNvPr id="203" name="CS 5500: Course Objective"/>
+          <p:cNvSpPr txBox="1">
             <a:spLocks noGrp="1"/>
           </p:cNvSpPr>
           <p:nvPr>
@@ -9289,25 +9528,31 @@
         <p:spPr/>
         <p:txBody>
           <a:bodyPr/>
-          <a:lstStyle/>
-          <a:p>
-            <a:r>
-              <a:rPr lang="en-US" dirty="0"/>
-              <a:t>Good code is necessary but not sufficient</a:t>
-            </a:r>
-          </a:p>
-        </p:txBody>
-      </p:sp>
-      <p:sp>
-        <p:nvSpPr>
-          <p:cNvPr id="3" name="Text Placeholder 2">
-            <a:extLst>
-              <a:ext uri="{FF2B5EF4-FFF2-40B4-BE49-F238E27FC236}">
-                <a16:creationId xmlns:a16="http://schemas.microsoft.com/office/drawing/2014/main" id="{9B785202-0527-4BED-9195-BD1721F90A93}"/>
-              </a:ext>
-            </a:extLst>
-          </p:cNvPr>
-          <p:cNvSpPr>
+          <a:lstStyle>
+            <a:lvl1pPr>
+              <a:defRPr>
+                <a:solidFill>
+                  <a:srgbClr val="005493"/>
+                </a:solidFill>
+              </a:defRPr>
+            </a:lvl1pPr>
+          </a:lstStyle>
+          <a:p>
+            <a:r>
+              <a:rPr lang="en-US" dirty="0">
+                <a:solidFill>
+                  <a:srgbClr val="0070C0"/>
+                </a:solidFill>
+              </a:rPr>
+              <a:t>Learning Objectives for this course:</a:t>
+            </a:r>
+          </a:p>
+        </p:txBody>
+      </p:sp>
+      <p:sp>
+        <p:nvSpPr>
+          <p:cNvPr id="204" name="Developing skills that are necessary for successful software development…"/>
+          <p:cNvSpPr txBox="1">
             <a:spLocks noGrp="1"/>
           </p:cNvSpPr>
           <p:nvPr>
@@ -9323,78 +9568,46 @@
           <a:p>
             <a:r>
               <a:rPr lang="en-US" dirty="0"/>
-              <a:t>Developing software is a </a:t>
-            </a:r>
-            <a:r>
-              <a:rPr lang="en-US" b="1" i="1" dirty="0"/>
-              <a:t>systems enterprise</a:t>
+              <a:t>By the end of this course you will--</a:t>
             </a:r>
           </a:p>
           <a:p>
             <a:pPr lvl="1"/>
             <a:r>
               <a:rPr lang="en-US" dirty="0"/>
-              <a:t>there are many stakeholders</a:t>
+              <a:t>Be able to define and describe the phases of the software engineering lifecycle.</a:t>
             </a:r>
           </a:p>
           <a:p>
             <a:pPr lvl="1"/>
             <a:r>
               <a:rPr lang="en-US" dirty="0"/>
-              <a:t>how to determine the requirements?</a:t>
+              <a:t>Be able to explain the role of key processes and technologies in modern software development.</a:t>
             </a:r>
           </a:p>
           <a:p>
             <a:pPr lvl="1"/>
             <a:r>
               <a:rPr lang="en-US" dirty="0"/>
-              <a:t>how to design code for:</a:t>
-            </a:r>
-          </a:p>
-          <a:p>
-            <a:pPr lvl="2"/>
-            <a:r>
-              <a:rPr lang="en-US" dirty="0"/>
-              <a:t> reuse, readability, scale? other factors?</a:t>
+              <a:t>Be able to productively apply instances of major tools used in elementary SE tasks.</a:t>
             </a:r>
           </a:p>
           <a:p>
             <a:pPr lvl="1"/>
             <a:r>
               <a:rPr lang="en-US" dirty="0"/>
-              <a:t>how to organize the development process?</a:t>
-            </a:r>
-          </a:p>
-          <a:p>
-            <a:pPr lvl="1"/>
-            <a:r>
-              <a:rPr lang="en-US" dirty="0"/>
-              <a:t>how to make sure you've built the thing right?</a:t>
-            </a:r>
-          </a:p>
-          <a:p>
-            <a:pPr lvl="1"/>
-            <a:r>
-              <a:rPr lang="en-US" dirty="0"/>
-              <a:t>how to make sure you've built the right thing?</a:t>
-            </a:r>
-          </a:p>
-          <a:p>
-            <a:pPr lvl="1"/>
+              <a:t>Design and implement a portfolio-worthy software engineering project in a small team environment that can be showcased to recruiters.</a:t>
+            </a:r>
+          </a:p>
+          <a:p>
             <a:endParaRPr lang="en-US" dirty="0"/>
           </a:p>
         </p:txBody>
       </p:sp>
       <p:sp>
         <p:nvSpPr>
-          <p:cNvPr id="4" name="Slide Number Placeholder 3">
-            <a:extLst>
-              <a:ext uri="{FF2B5EF4-FFF2-40B4-BE49-F238E27FC236}">
-                <a16:creationId xmlns:a16="http://schemas.microsoft.com/office/drawing/2014/main" id="{058D416C-4FDF-4DDB-B02D-6B36EF1E1AA4}"/>
-              </a:ext>
-            </a:extLst>
-          </p:cNvPr>
-          <p:cNvSpPr>
+          <p:cNvPr id="205" name="Slide Number"/>
+          <p:cNvSpPr txBox="1">
             <a:spLocks noGrp="1"/>
           </p:cNvSpPr>
           <p:nvPr>
@@ -9406,14 +9619,9 @@
           <a:bodyPr/>
           <a:lstStyle/>
           <a:p>
-            <a:pPr defTabSz="547695">
-              <a:defRPr/>
-            </a:pPr>
             <a:fld id="{86CB4B4D-7CA3-9044-876B-883B54F8677D}" type="slidenum">
-              <a:rPr lang="en-US" smtClean="0"/>
-              <a:pPr defTabSz="547695">
-                <a:defRPr/>
-              </a:pPr>
+              <a:rPr lang="en-US"/>
+              <a:pPr/>
               <a:t>7</a:t>
             </a:fld>
             <a:endParaRPr lang="en-US"/>
@@ -9421,11 +9629,6 @@
         </p:txBody>
       </p:sp>
     </p:spTree>
-    <p:extLst>
-      <p:ext uri="{BB962C8B-B14F-4D97-AF65-F5344CB8AC3E}">
-        <p14:creationId xmlns:p14="http://schemas.microsoft.com/office/powerpoint/2010/main" val="1789365757"/>
-      </p:ext>
-    </p:extLst>
   </p:cSld>
   <p:clrMapOvr>
     <a:masterClrMapping/>
@@ -9455,7 +9658,7 @@
           <p:cNvPr id="2" name="Title 1">
             <a:extLst>
               <a:ext uri="{FF2B5EF4-FFF2-40B4-BE49-F238E27FC236}">
-                <a16:creationId xmlns:a16="http://schemas.microsoft.com/office/drawing/2014/main" id="{E1A1CA2F-B830-4EF9-AABF-DC522F2572EF}"/>
+                <a16:creationId xmlns:a16="http://schemas.microsoft.com/office/drawing/2014/main" id="{B6D33575-0593-49FD-831F-131BB6CC7E6C}"/>
               </a:ext>
             </a:extLst>
           </p:cNvPr>
@@ -9473,7 +9676,7 @@
           <a:p>
             <a:r>
               <a:rPr lang="en-US" dirty="0"/>
-              <a:t>SE includes Tools and Processes</a:t>
+              <a:t>Learning Objectives for this Lesson</a:t>
             </a:r>
           </a:p>
         </p:txBody>
@@ -9483,7 +9686,7 @@
           <p:cNvPr id="3" name="Text Placeholder 2">
             <a:extLst>
               <a:ext uri="{FF2B5EF4-FFF2-40B4-BE49-F238E27FC236}">
-                <a16:creationId xmlns:a16="http://schemas.microsoft.com/office/drawing/2014/main" id="{1A2C1194-FA42-4E3A-A65B-A1165F11DFB1}"/>
+                <a16:creationId xmlns:a16="http://schemas.microsoft.com/office/drawing/2014/main" id="{5B21ECCD-9823-405F-AA9A-D0CC235AD583}"/>
               </a:ext>
             </a:extLst>
           </p:cNvPr>
@@ -9496,57 +9699,53 @@
         </p:nvSpPr>
         <p:spPr/>
         <p:txBody>
-          <a:bodyPr>
-            <a:normAutofit/>
-          </a:bodyPr>
-          <a:lstStyle/>
-          <a:p>
-            <a:r>
-              <a:rPr lang="en-US" dirty="0"/>
-              <a:t>The answers to those questions will depend on things like:</a:t>
+          <a:bodyPr/>
+          <a:lstStyle/>
+          <a:p>
+            <a:r>
+              <a:rPr lang="en-US" dirty="0"/>
+              <a:t>By the end of this lesson you should be able to:</a:t>
             </a:r>
           </a:p>
           <a:p>
             <a:pPr lvl="1"/>
             <a:r>
               <a:rPr lang="en-US" dirty="0"/>
-              <a:t>the size of the team</a:t>
+              <a:t>Explain what SE is and why it’s important</a:t>
             </a:r>
           </a:p>
           <a:p>
             <a:pPr lvl="1"/>
             <a:r>
               <a:rPr lang="en-US" dirty="0"/>
-              <a:t>the size of the product</a:t>
+              <a:t>List your weekly obligations as a student</a:t>
             </a:r>
           </a:p>
           <a:p>
             <a:pPr lvl="1"/>
             <a:r>
               <a:rPr lang="en-US" dirty="0"/>
-              <a:t>the longevity of the product</a:t>
-            </a:r>
-          </a:p>
-          <a:p>
-            <a:r>
-              <a:rPr lang="en-US" dirty="0"/>
-              <a:t>There's no one "right" way; there are always tradeoffs.</a:t>
-            </a:r>
-          </a:p>
-          <a:p>
-            <a:r>
-              <a:rPr lang="en-US" dirty="0"/>
-              <a:t>But there are best practices, which we will expect you to follow.</a:t>
-            </a:r>
-          </a:p>
-        </p:txBody>
-      </p:sp>
-      <p:sp>
-        <p:nvSpPr>
-          <p:cNvPr id="4" name="Slide Number Placeholder 3">
-            <a:extLst>
-              <a:ext uri="{FF2B5EF4-FFF2-40B4-BE49-F238E27FC236}">
-                <a16:creationId xmlns:a16="http://schemas.microsoft.com/office/drawing/2014/main" id="{A249E72F-16DC-4F27-A68F-C6A31919E455}"/>
+              <a:t>List the requirements for completing the course</a:t>
+            </a:r>
+          </a:p>
+          <a:p>
+            <a:pPr lvl="1"/>
+            <a:r>
+              <a:rPr lang="en-US" dirty="0"/>
+              <a:t>Explain how assignments will be graded</a:t>
+            </a:r>
+          </a:p>
+          <a:p>
+            <a:endParaRPr lang="en-US" dirty="0"/>
+          </a:p>
+        </p:txBody>
+      </p:sp>
+      <p:sp>
+        <p:nvSpPr>
+          <p:cNvPr id="5" name="Slide Number Placeholder 4">
+            <a:extLst>
+              <a:ext uri="{FF2B5EF4-FFF2-40B4-BE49-F238E27FC236}">
+                <a16:creationId xmlns:a16="http://schemas.microsoft.com/office/drawing/2014/main" id="{D3CB1048-3EB8-4281-8361-E7EB70F6FBBC}"/>
               </a:ext>
             </a:extLst>
           </p:cNvPr>
@@ -9562,14 +9761,9 @@
           <a:bodyPr/>
           <a:lstStyle/>
           <a:p>
-            <a:pPr defTabSz="547695">
-              <a:defRPr/>
-            </a:pPr>
             <a:fld id="{86CB4B4D-7CA3-9044-876B-883B54F8677D}" type="slidenum">
               <a:rPr lang="en-US" smtClean="0"/>
-              <a:pPr defTabSz="547695">
-                <a:defRPr/>
-              </a:pPr>
+              <a:pPr/>
               <a:t>8</a:t>
             </a:fld>
             <a:endParaRPr lang="en-US"/>
@@ -9579,7 +9773,7 @@
     </p:spTree>
     <p:extLst>
       <p:ext uri="{BB962C8B-B14F-4D97-AF65-F5344CB8AC3E}">
-        <p14:creationId xmlns:p14="http://schemas.microsoft.com/office/powerpoint/2010/main" val="1909338716"/>
+        <p14:creationId xmlns:p14="http://schemas.microsoft.com/office/powerpoint/2010/main" val="3915051007"/>
       </p:ext>
     </p:extLst>
   </p:cSld>
@@ -9679,7 +9873,7 @@
             </a:r>
             <a:r>
               <a:rPr lang="en-US" dirty="0"/>
-              <a:t>. 4 </a:t>
+              <a:t>. 3 </a:t>
             </a:r>
             <a:r>
               <a:rPr lang="en-US" dirty="0" err="1"/>

</xml_diff>

<commit_message>
added Sagar picture to Lesson 1.1
</commit_message>
<xml_diff>
--- a/Slides/Lesson 1.1 Course Introduction.pptx
+++ b/Slides/Lesson 1.1 Course Introduction.pptx
@@ -222,7 +222,7 @@
           <a:p>
             <a:fld id="{7C7E5181-6CF5-45F7-A87A-E0E0B1FD7549}" type="datetimeFigureOut">
               <a:rPr lang="en-US" smtClean="0"/>
-              <a:t>1/14/2021</a:t>
+              <a:t>1/18/2021</a:t>
             </a:fld>
             <a:endParaRPr lang="en-US"/>
           </a:p>
@@ -786,7 +786,7 @@
           <a:p>
             <a:fld id="{5D2A64DE-480B-420F-9649-4F8E696E08E0}" type="datetime1">
               <a:rPr lang="en-US" smtClean="0"/>
-              <a:t>1/14/2021</a:t>
+              <a:t>1/18/2021</a:t>
             </a:fld>
             <a:endParaRPr lang="en-US"/>
           </a:p>
@@ -1020,7 +1020,7 @@
           <a:p>
             <a:fld id="{0D3616D0-8311-4107-9726-6B805E7D05BA}" type="datetime1">
               <a:rPr lang="en-US" smtClean="0"/>
-              <a:t>1/14/2021</a:t>
+              <a:t>1/18/2021</a:t>
             </a:fld>
             <a:endParaRPr lang="en-US"/>
           </a:p>
@@ -1228,7 +1228,7 @@
           <a:p>
             <a:fld id="{3BC2557A-5C88-417A-A763-5AC779462A5F}" type="datetime1">
               <a:rPr lang="en-US" smtClean="0"/>
-              <a:t>1/14/2021</a:t>
+              <a:t>1/18/2021</a:t>
             </a:fld>
             <a:endParaRPr lang="en-US"/>
           </a:p>
@@ -1752,7 +1752,7 @@
           <a:p>
             <a:fld id="{07C7BFD4-467E-4EDE-93EA-052F5B39A4E5}" type="datetime1">
               <a:rPr lang="en-US" smtClean="0"/>
-              <a:t>1/14/2021</a:t>
+              <a:t>1/18/2021</a:t>
             </a:fld>
             <a:endParaRPr lang="en-US"/>
           </a:p>
@@ -2065,7 +2065,7 @@
           <a:p>
             <a:fld id="{A533CBE2-D5BE-47AC-ADC2-9CDFC1D0CF90}" type="datetime1">
               <a:rPr lang="en-US" smtClean="0"/>
-              <a:t>1/14/2021</a:t>
+              <a:t>1/18/2021</a:t>
             </a:fld>
             <a:endParaRPr lang="en-US"/>
           </a:p>
@@ -2366,7 +2366,7 @@
           <a:p>
             <a:fld id="{39B7EDB1-CE74-4951-85A2-0B01C2128E28}" type="datetime1">
               <a:rPr lang="en-US" smtClean="0"/>
-              <a:t>1/14/2021</a:t>
+              <a:t>1/18/2021</a:t>
             </a:fld>
             <a:endParaRPr lang="en-US"/>
           </a:p>
@@ -2814,7 +2814,7 @@
           <a:p>
             <a:fld id="{2BC7EB92-A5C2-4807-A9DC-9EDE6CBFB241}" type="datetime1">
               <a:rPr lang="en-US" smtClean="0"/>
-              <a:t>1/14/2021</a:t>
+              <a:t>1/18/2021</a:t>
             </a:fld>
             <a:endParaRPr lang="en-US"/>
           </a:p>
@@ -2960,7 +2960,7 @@
           <a:p>
             <a:fld id="{109E55A0-C911-4F03-82FC-7E5926047D46}" type="datetime1">
               <a:rPr lang="en-US" smtClean="0"/>
-              <a:t>1/14/2021</a:t>
+              <a:t>1/18/2021</a:t>
             </a:fld>
             <a:endParaRPr lang="en-US"/>
           </a:p>
@@ -3109,7 +3109,7 @@
           <a:p>
             <a:fld id="{2B7B7EE0-7771-4CD5-9B2B-3550753A54A1}" type="datetime1">
               <a:rPr lang="en-US" smtClean="0"/>
-              <a:t>1/14/2021</a:t>
+              <a:t>1/18/2021</a:t>
             </a:fld>
             <a:endParaRPr lang="en-US"/>
           </a:p>
@@ -3420,7 +3420,7 @@
           <a:p>
             <a:fld id="{F8B318B3-0E87-4416-A9B8-D891968C2727}" type="datetime1">
               <a:rPr lang="en-US" smtClean="0"/>
-              <a:t>1/14/2021</a:t>
+              <a:t>1/18/2021</a:t>
             </a:fld>
             <a:endParaRPr lang="en-US"/>
           </a:p>
@@ -3708,7 +3708,7 @@
           <a:p>
             <a:fld id="{EA476A42-A091-4468-A075-64A31BE59948}" type="datetime1">
               <a:rPr lang="en-US" smtClean="0"/>
-              <a:t>1/14/2021</a:t>
+              <a:t>1/18/2021</a:t>
             </a:fld>
             <a:endParaRPr lang="en-US"/>
           </a:p>
@@ -3949,7 +3949,7 @@
           <a:p>
             <a:fld id="{54D997E8-DDEE-43F1-8D9B-F8A1E11DE488}" type="datetime1">
               <a:rPr lang="en-US" smtClean="0"/>
-              <a:t>1/14/2021</a:t>
+              <a:t>1/18/2021</a:t>
             </a:fld>
             <a:endParaRPr lang="en-US"/>
           </a:p>
@@ -8535,7 +8535,7 @@
           </a:ln>
           <a:extLst>
             <a:ext uri="{C572A759-6A51-4108-AA02-DFA0A04FC94B}">
-              <ma14:wrappingTextBoxFlag xmlns="" xmlns:m="http://schemas.openxmlformats.org/officeDocument/2006/math" xmlns:a14="http://schemas.microsoft.com/office/drawing/2010/main" xmlns:ma14="http://schemas.microsoft.com/office/mac/drawingml/2011/main" val="1"/>
+              <ma14:wrappingTextBoxFlag xmlns:ma14="http://schemas.microsoft.com/office/mac/drawingml/2011/main" xmlns:a14="http://schemas.microsoft.com/office/drawing/2010/main" xmlns:m="http://schemas.openxmlformats.org/officeDocument/2006/math" xmlns="" val="1"/>
             </a:ext>
           </a:extLst>
         </p:spPr>
@@ -8572,7 +8572,7 @@
           </a:ln>
           <a:extLst>
             <a:ext uri="{C572A759-6A51-4108-AA02-DFA0A04FC94B}">
-              <ma14:wrappingTextBoxFlag xmlns="" xmlns:m="http://schemas.openxmlformats.org/officeDocument/2006/math" xmlns:a14="http://schemas.microsoft.com/office/drawing/2010/main" xmlns:ma14="http://schemas.microsoft.com/office/mac/drawingml/2011/main" val="1"/>
+              <ma14:wrappingTextBoxFlag xmlns:ma14="http://schemas.microsoft.com/office/mac/drawingml/2011/main" xmlns:a14="http://schemas.microsoft.com/office/drawing/2010/main" xmlns:m="http://schemas.openxmlformats.org/officeDocument/2006/math" xmlns="" val="1"/>
             </a:ext>
           </a:extLst>
         </p:spPr>
@@ -8613,7 +8613,7 @@
           </a:ln>
           <a:extLst>
             <a:ext uri="{C572A759-6A51-4108-AA02-DFA0A04FC94B}">
-              <ma14:wrappingTextBoxFlag xmlns="" xmlns:m="http://schemas.openxmlformats.org/officeDocument/2006/math" xmlns:a14="http://schemas.microsoft.com/office/drawing/2010/main" xmlns:ma14="http://schemas.microsoft.com/office/mac/drawingml/2011/main" val="1"/>
+              <ma14:wrappingTextBoxFlag xmlns:ma14="http://schemas.microsoft.com/office/mac/drawingml/2011/main" xmlns:a14="http://schemas.microsoft.com/office/drawing/2010/main" xmlns:m="http://schemas.openxmlformats.org/officeDocument/2006/math" xmlns="" val="1"/>
             </a:ext>
           </a:extLst>
         </p:spPr>
@@ -8654,7 +8654,7 @@
           </a:ln>
           <a:extLst>
             <a:ext uri="{C572A759-6A51-4108-AA02-DFA0A04FC94B}">
-              <ma14:wrappingTextBoxFlag xmlns="" xmlns:m="http://schemas.openxmlformats.org/officeDocument/2006/math" xmlns:a14="http://schemas.microsoft.com/office/drawing/2010/main" xmlns:ma14="http://schemas.microsoft.com/office/mac/drawingml/2011/main" val="1"/>
+              <ma14:wrappingTextBoxFlag xmlns:ma14="http://schemas.microsoft.com/office/mac/drawingml/2011/main" xmlns:a14="http://schemas.microsoft.com/office/drawing/2010/main" xmlns:m="http://schemas.openxmlformats.org/officeDocument/2006/math" xmlns="" val="1"/>
             </a:ext>
           </a:extLst>
         </p:spPr>
@@ -8690,7 +8690,7 @@
           </a:ln>
           <a:extLst>
             <a:ext uri="{C572A759-6A51-4108-AA02-DFA0A04FC94B}">
-              <ma14:wrappingTextBoxFlag xmlns="" xmlns:m="http://schemas.openxmlformats.org/officeDocument/2006/math" xmlns:a14="http://schemas.microsoft.com/office/drawing/2010/main" xmlns:ma14="http://schemas.microsoft.com/office/mac/drawingml/2011/main" val="1"/>
+              <ma14:wrappingTextBoxFlag xmlns:ma14="http://schemas.microsoft.com/office/mac/drawingml/2011/main" xmlns:a14="http://schemas.microsoft.com/office/drawing/2010/main" xmlns:m="http://schemas.openxmlformats.org/officeDocument/2006/math" xmlns="" val="1"/>
             </a:ext>
           </a:extLst>
         </p:spPr>
@@ -8925,7 +8925,7 @@
           </a:ln>
           <a:extLst>
             <a:ext uri="{C572A759-6A51-4108-AA02-DFA0A04FC94B}">
-              <ma14:wrappingTextBoxFlag xmlns="" xmlns:m="http://schemas.openxmlformats.org/officeDocument/2006/math" xmlns:a14="http://schemas.microsoft.com/office/drawing/2010/main" xmlns:ma14="http://schemas.microsoft.com/office/mac/drawingml/2011/main" val="1"/>
+              <ma14:wrappingTextBoxFlag xmlns:ma14="http://schemas.microsoft.com/office/mac/drawingml/2011/main" xmlns:a14="http://schemas.microsoft.com/office/drawing/2010/main" xmlns:m="http://schemas.openxmlformats.org/officeDocument/2006/math" xmlns="" val="1"/>
             </a:ext>
           </a:extLst>
         </p:spPr>
@@ -8972,7 +8972,7 @@
           </a:ln>
           <a:extLst>
             <a:ext uri="{C572A759-6A51-4108-AA02-DFA0A04FC94B}">
-              <ma14:wrappingTextBoxFlag xmlns="" xmlns:m="http://schemas.openxmlformats.org/officeDocument/2006/math" xmlns:a14="http://schemas.microsoft.com/office/drawing/2010/main" xmlns:ma14="http://schemas.microsoft.com/office/mac/drawingml/2011/main" val="1"/>
+              <ma14:wrappingTextBoxFlag xmlns:ma14="http://schemas.microsoft.com/office/mac/drawingml/2011/main" xmlns:a14="http://schemas.microsoft.com/office/drawing/2010/main" xmlns:m="http://schemas.openxmlformats.org/officeDocument/2006/math" xmlns="" val="1"/>
             </a:ext>
           </a:extLst>
         </p:spPr>
@@ -9025,6 +9025,89 @@
           </a:prstGeom>
         </p:spPr>
       </p:pic>
+      <p:pic>
+        <p:nvPicPr>
+          <p:cNvPr id="4" name="Picture 3">
+            <a:extLst>
+              <a:ext uri="{FF2B5EF4-FFF2-40B4-BE49-F238E27FC236}">
+                <a16:creationId xmlns:a16="http://schemas.microsoft.com/office/drawing/2014/main" id="{C253E4C4-061A-40E3-8B8F-1FCEE5FEF1ED}"/>
+              </a:ext>
+            </a:extLst>
+          </p:cNvPr>
+          <p:cNvPicPr>
+            <a:picLocks noChangeAspect="1"/>
+          </p:cNvPicPr>
+          <p:nvPr/>
+        </p:nvPicPr>
+        <p:blipFill>
+          <a:blip r:embed="rId9">
+            <a:extLst>
+              <a:ext uri="{28A0092B-C50C-407E-A947-70E740481C1C}">
+                <a14:useLocalDpi xmlns:a14="http://schemas.microsoft.com/office/drawing/2010/main" val="0"/>
+              </a:ext>
+            </a:extLst>
+          </a:blip>
+          <a:stretch>
+            <a:fillRect/>
+          </a:stretch>
+        </p:blipFill>
+        <p:spPr>
+          <a:xfrm>
+            <a:off x="7606711" y="4426827"/>
+            <a:ext cx="2036615" cy="2036615"/>
+          </a:xfrm>
+          <a:prstGeom prst="rect">
+            <a:avLst/>
+          </a:prstGeom>
+        </p:spPr>
+      </p:pic>
+      <p:sp>
+        <p:nvSpPr>
+          <p:cNvPr id="20" name="Weijie (Ben) Deng">
+            <a:extLst>
+              <a:ext uri="{FF2B5EF4-FFF2-40B4-BE49-F238E27FC236}">
+                <a16:creationId xmlns:a16="http://schemas.microsoft.com/office/drawing/2014/main" id="{909DEB5E-6566-4619-A192-809F53977DC2}"/>
+              </a:ext>
+            </a:extLst>
+          </p:cNvPr>
+          <p:cNvSpPr txBox="1"/>
+          <p:nvPr/>
+        </p:nvSpPr>
+        <p:spPr>
+          <a:xfrm>
+            <a:off x="7811141" y="6524646"/>
+            <a:ext cx="1627753" cy="328295"/>
+          </a:xfrm>
+          <a:prstGeom prst="rect">
+            <a:avLst/>
+          </a:prstGeom>
+          <a:ln w="12700">
+            <a:miter lim="400000"/>
+          </a:ln>
+          <a:extLst>
+            <a:ext uri="{C572A759-6A51-4108-AA02-DFA0A04FC94B}">
+              <ma14:wrappingTextBoxFlag xmlns:ma14="http://schemas.microsoft.com/office/mac/drawingml/2011/main" xmlns:a14="http://schemas.microsoft.com/office/drawing/2010/main" xmlns:m="http://schemas.openxmlformats.org/officeDocument/2006/math" xmlns="" val="1"/>
+            </a:ext>
+          </a:extLst>
+        </p:spPr>
+        <p:txBody>
+          <a:bodyPr wrap="none" lIns="25400" tIns="25400" rIns="25400" bIns="25400" anchor="ctr">
+            <a:spAutoFit/>
+          </a:bodyPr>
+          <a:lstStyle/>
+          <a:p>
+            <a:r>
+              <a:rPr lang="en-US" dirty="0"/>
+              <a:t>Sagar Madhu </a:t>
+            </a:r>
+            <a:r>
+              <a:rPr lang="en-US" dirty="0" err="1"/>
+              <a:t>Ayi</a:t>
+            </a:r>
+            <a:endParaRPr dirty="0"/>
+          </a:p>
+        </p:txBody>
+      </p:sp>
     </p:spTree>
   </p:cSld>
   <p:clrMapOvr>

</xml_diff>

<commit_message>
add L2.2 + UML Activity
</commit_message>
<xml_diff>
--- a/Slides/Lesson 1.1 Course Introduction.pptx
+++ b/Slides/Lesson 1.1 Course Introduction.pptx
@@ -222,7 +222,7 @@
           <a:p>
             <a:fld id="{7C7E5181-6CF5-45F7-A87A-E0E0B1FD7549}" type="datetimeFigureOut">
               <a:rPr lang="en-US" smtClean="0"/>
-              <a:t>1/18/2021</a:t>
+              <a:t>1/21/2021</a:t>
             </a:fld>
             <a:endParaRPr lang="en-US"/>
           </a:p>
@@ -786,7 +786,7 @@
           <a:p>
             <a:fld id="{5D2A64DE-480B-420F-9649-4F8E696E08E0}" type="datetime1">
               <a:rPr lang="en-US" smtClean="0"/>
-              <a:t>1/18/2021</a:t>
+              <a:t>1/21/2021</a:t>
             </a:fld>
             <a:endParaRPr lang="en-US"/>
           </a:p>
@@ -1020,7 +1020,7 @@
           <a:p>
             <a:fld id="{0D3616D0-8311-4107-9726-6B805E7D05BA}" type="datetime1">
               <a:rPr lang="en-US" smtClean="0"/>
-              <a:t>1/18/2021</a:t>
+              <a:t>1/21/2021</a:t>
             </a:fld>
             <a:endParaRPr lang="en-US"/>
           </a:p>
@@ -1228,7 +1228,7 @@
           <a:p>
             <a:fld id="{3BC2557A-5C88-417A-A763-5AC779462A5F}" type="datetime1">
               <a:rPr lang="en-US" smtClean="0"/>
-              <a:t>1/18/2021</a:t>
+              <a:t>1/21/2021</a:t>
             </a:fld>
             <a:endParaRPr lang="en-US"/>
           </a:p>
@@ -1752,7 +1752,7 @@
           <a:p>
             <a:fld id="{07C7BFD4-467E-4EDE-93EA-052F5B39A4E5}" type="datetime1">
               <a:rPr lang="en-US" smtClean="0"/>
-              <a:t>1/18/2021</a:t>
+              <a:t>1/21/2021</a:t>
             </a:fld>
             <a:endParaRPr lang="en-US"/>
           </a:p>
@@ -2065,7 +2065,7 @@
           <a:p>
             <a:fld id="{A533CBE2-D5BE-47AC-ADC2-9CDFC1D0CF90}" type="datetime1">
               <a:rPr lang="en-US" smtClean="0"/>
-              <a:t>1/18/2021</a:t>
+              <a:t>1/21/2021</a:t>
             </a:fld>
             <a:endParaRPr lang="en-US"/>
           </a:p>
@@ -2366,7 +2366,7 @@
           <a:p>
             <a:fld id="{39B7EDB1-CE74-4951-85A2-0B01C2128E28}" type="datetime1">
               <a:rPr lang="en-US" smtClean="0"/>
-              <a:t>1/18/2021</a:t>
+              <a:t>1/21/2021</a:t>
             </a:fld>
             <a:endParaRPr lang="en-US"/>
           </a:p>
@@ -2814,7 +2814,7 @@
           <a:p>
             <a:fld id="{2BC7EB92-A5C2-4807-A9DC-9EDE6CBFB241}" type="datetime1">
               <a:rPr lang="en-US" smtClean="0"/>
-              <a:t>1/18/2021</a:t>
+              <a:t>1/21/2021</a:t>
             </a:fld>
             <a:endParaRPr lang="en-US"/>
           </a:p>
@@ -2960,7 +2960,7 @@
           <a:p>
             <a:fld id="{109E55A0-C911-4F03-82FC-7E5926047D46}" type="datetime1">
               <a:rPr lang="en-US" smtClean="0"/>
-              <a:t>1/18/2021</a:t>
+              <a:t>1/21/2021</a:t>
             </a:fld>
             <a:endParaRPr lang="en-US"/>
           </a:p>
@@ -3109,7 +3109,7 @@
           <a:p>
             <a:fld id="{2B7B7EE0-7771-4CD5-9B2B-3550753A54A1}" type="datetime1">
               <a:rPr lang="en-US" smtClean="0"/>
-              <a:t>1/18/2021</a:t>
+              <a:t>1/21/2021</a:t>
             </a:fld>
             <a:endParaRPr lang="en-US"/>
           </a:p>
@@ -3420,7 +3420,7 @@
           <a:p>
             <a:fld id="{F8B318B3-0E87-4416-A9B8-D891968C2727}" type="datetime1">
               <a:rPr lang="en-US" smtClean="0"/>
-              <a:t>1/18/2021</a:t>
+              <a:t>1/21/2021</a:t>
             </a:fld>
             <a:endParaRPr lang="en-US"/>
           </a:p>
@@ -3708,7 +3708,7 @@
           <a:p>
             <a:fld id="{EA476A42-A091-4468-A075-64A31BE59948}" type="datetime1">
               <a:rPr lang="en-US" smtClean="0"/>
-              <a:t>1/18/2021</a:t>
+              <a:t>1/21/2021</a:t>
             </a:fld>
             <a:endParaRPr lang="en-US"/>
           </a:p>
@@ -3949,7 +3949,7 @@
           <a:p>
             <a:fld id="{54D997E8-DDEE-43F1-8D9B-F8A1E11DE488}" type="datetime1">
               <a:rPr lang="en-US" smtClean="0"/>
-              <a:t>1/18/2021</a:t>
+              <a:t>1/21/2021</a:t>
             </a:fld>
             <a:endParaRPr lang="en-US"/>
           </a:p>
@@ -4511,6 +4511,78 @@
               <a:t>1</a:t>
             </a:fld>
             <a:endParaRPr lang="en-US"/>
+          </a:p>
+        </p:txBody>
+      </p:sp>
+      <p:sp>
+        <p:nvSpPr>
+          <p:cNvPr id="3" name="Rectangle 2">
+            <a:extLst>
+              <a:ext uri="{FF2B5EF4-FFF2-40B4-BE49-F238E27FC236}">
+                <a16:creationId xmlns:a16="http://schemas.microsoft.com/office/drawing/2014/main" id="{3B7BC06A-54D1-4D10-B536-9DF33B2C3997}"/>
+              </a:ext>
+            </a:extLst>
+          </p:cNvPr>
+          <p:cNvSpPr/>
+          <p:nvPr/>
+        </p:nvSpPr>
+        <p:spPr>
+          <a:xfrm>
+            <a:off x="539260" y="5710019"/>
+            <a:ext cx="6096000" cy="646331"/>
+          </a:xfrm>
+          <a:prstGeom prst="rect">
+            <a:avLst/>
+          </a:prstGeom>
+        </p:spPr>
+        <p:txBody>
+          <a:bodyPr>
+            <a:spAutoFit/>
+          </a:bodyPr>
+          <a:lstStyle/>
+          <a:p>
+            <a:r>
+              <a:rPr lang="en-US" dirty="0">
+                <a:solidFill>
+                  <a:srgbClr val="5C5962"/>
+                </a:solidFill>
+              </a:rPr>
+              <a:t>© 2021 Jonathan Bell, John </a:t>
+            </a:r>
+            <a:r>
+              <a:rPr lang="en-US" dirty="0" err="1">
+                <a:solidFill>
+                  <a:srgbClr val="5C5962"/>
+                </a:solidFill>
+              </a:rPr>
+              <a:t>Boyland</a:t>
+            </a:r>
+            <a:r>
+              <a:rPr lang="en-US" dirty="0">
+                <a:solidFill>
+                  <a:srgbClr val="5C5962"/>
+                </a:solidFill>
+              </a:rPr>
+              <a:t> and Mitch Wand. Released under the </a:t>
+            </a:r>
+            <a:r>
+              <a:rPr lang="en-US" dirty="0">
+                <a:solidFill>
+                  <a:srgbClr val="D41B2C"/>
+                </a:solidFill>
+                <a:hlinkClick r:id="rId2"/>
+              </a:rPr>
+              <a:t>CC BY-SA</a:t>
+            </a:r>
+            <a:r>
+              <a:rPr lang="en-US" dirty="0">
+                <a:solidFill>
+                  <a:srgbClr val="5C5962"/>
+                </a:solidFill>
+              </a:rPr>
+              <a:t> license</a:t>
+            </a:r>
+            <a:endParaRPr lang="en-US" dirty="0"/>
           </a:p>
         </p:txBody>
       </p:sp>
@@ -8535,7 +8607,7 @@
           </a:ln>
           <a:extLst>
             <a:ext uri="{C572A759-6A51-4108-AA02-DFA0A04FC94B}">
-              <ma14:wrappingTextBoxFlag xmlns:ma14="http://schemas.microsoft.com/office/mac/drawingml/2011/main" xmlns:a14="http://schemas.microsoft.com/office/drawing/2010/main" xmlns:m="http://schemas.openxmlformats.org/officeDocument/2006/math" xmlns="" val="1"/>
+              <ma14:wrappingTextBoxFlag xmlns="" xmlns:m="http://schemas.openxmlformats.org/officeDocument/2006/math" xmlns:a14="http://schemas.microsoft.com/office/drawing/2010/main" xmlns:ma14="http://schemas.microsoft.com/office/mac/drawingml/2011/main" val="1"/>
             </a:ext>
           </a:extLst>
         </p:spPr>
@@ -8572,7 +8644,7 @@
           </a:ln>
           <a:extLst>
             <a:ext uri="{C572A759-6A51-4108-AA02-DFA0A04FC94B}">
-              <ma14:wrappingTextBoxFlag xmlns:ma14="http://schemas.microsoft.com/office/mac/drawingml/2011/main" xmlns:a14="http://schemas.microsoft.com/office/drawing/2010/main" xmlns:m="http://schemas.openxmlformats.org/officeDocument/2006/math" xmlns="" val="1"/>
+              <ma14:wrappingTextBoxFlag xmlns="" xmlns:m="http://schemas.openxmlformats.org/officeDocument/2006/math" xmlns:a14="http://schemas.microsoft.com/office/drawing/2010/main" xmlns:ma14="http://schemas.microsoft.com/office/mac/drawingml/2011/main" val="1"/>
             </a:ext>
           </a:extLst>
         </p:spPr>
@@ -8613,7 +8685,7 @@
           </a:ln>
           <a:extLst>
             <a:ext uri="{C572A759-6A51-4108-AA02-DFA0A04FC94B}">
-              <ma14:wrappingTextBoxFlag xmlns:ma14="http://schemas.microsoft.com/office/mac/drawingml/2011/main" xmlns:a14="http://schemas.microsoft.com/office/drawing/2010/main" xmlns:m="http://schemas.openxmlformats.org/officeDocument/2006/math" xmlns="" val="1"/>
+              <ma14:wrappingTextBoxFlag xmlns="" xmlns:m="http://schemas.openxmlformats.org/officeDocument/2006/math" xmlns:a14="http://schemas.microsoft.com/office/drawing/2010/main" xmlns:ma14="http://schemas.microsoft.com/office/mac/drawingml/2011/main" val="1"/>
             </a:ext>
           </a:extLst>
         </p:spPr>
@@ -8654,7 +8726,7 @@
           </a:ln>
           <a:extLst>
             <a:ext uri="{C572A759-6A51-4108-AA02-DFA0A04FC94B}">
-              <ma14:wrappingTextBoxFlag xmlns:ma14="http://schemas.microsoft.com/office/mac/drawingml/2011/main" xmlns:a14="http://schemas.microsoft.com/office/drawing/2010/main" xmlns:m="http://schemas.openxmlformats.org/officeDocument/2006/math" xmlns="" val="1"/>
+              <ma14:wrappingTextBoxFlag xmlns="" xmlns:m="http://schemas.openxmlformats.org/officeDocument/2006/math" xmlns:a14="http://schemas.microsoft.com/office/drawing/2010/main" xmlns:ma14="http://schemas.microsoft.com/office/mac/drawingml/2011/main" val="1"/>
             </a:ext>
           </a:extLst>
         </p:spPr>
@@ -8690,7 +8762,7 @@
           </a:ln>
           <a:extLst>
             <a:ext uri="{C572A759-6A51-4108-AA02-DFA0A04FC94B}">
-              <ma14:wrappingTextBoxFlag xmlns:ma14="http://schemas.microsoft.com/office/mac/drawingml/2011/main" xmlns:a14="http://schemas.microsoft.com/office/drawing/2010/main" xmlns:m="http://schemas.openxmlformats.org/officeDocument/2006/math" xmlns="" val="1"/>
+              <ma14:wrappingTextBoxFlag xmlns="" xmlns:m="http://schemas.openxmlformats.org/officeDocument/2006/math" xmlns:a14="http://schemas.microsoft.com/office/drawing/2010/main" xmlns:ma14="http://schemas.microsoft.com/office/mac/drawingml/2011/main" val="1"/>
             </a:ext>
           </a:extLst>
         </p:spPr>
@@ -8925,7 +8997,7 @@
           </a:ln>
           <a:extLst>
             <a:ext uri="{C572A759-6A51-4108-AA02-DFA0A04FC94B}">
-              <ma14:wrappingTextBoxFlag xmlns:ma14="http://schemas.microsoft.com/office/mac/drawingml/2011/main" xmlns:a14="http://schemas.microsoft.com/office/drawing/2010/main" xmlns:m="http://schemas.openxmlformats.org/officeDocument/2006/math" xmlns="" val="1"/>
+              <ma14:wrappingTextBoxFlag xmlns="" xmlns:m="http://schemas.openxmlformats.org/officeDocument/2006/math" xmlns:a14="http://schemas.microsoft.com/office/drawing/2010/main" xmlns:ma14="http://schemas.microsoft.com/office/mac/drawingml/2011/main" val="1"/>
             </a:ext>
           </a:extLst>
         </p:spPr>
@@ -8972,7 +9044,7 @@
           </a:ln>
           <a:extLst>
             <a:ext uri="{C572A759-6A51-4108-AA02-DFA0A04FC94B}">
-              <ma14:wrappingTextBoxFlag xmlns:ma14="http://schemas.microsoft.com/office/mac/drawingml/2011/main" xmlns:a14="http://schemas.microsoft.com/office/drawing/2010/main" xmlns:m="http://schemas.openxmlformats.org/officeDocument/2006/math" xmlns="" val="1"/>
+              <ma14:wrappingTextBoxFlag xmlns="" xmlns:m="http://schemas.openxmlformats.org/officeDocument/2006/math" xmlns:a14="http://schemas.microsoft.com/office/drawing/2010/main" xmlns:ma14="http://schemas.microsoft.com/office/mac/drawingml/2011/main" val="1"/>
             </a:ext>
           </a:extLst>
         </p:spPr>
@@ -9086,7 +9158,7 @@
           </a:ln>
           <a:extLst>
             <a:ext uri="{C572A759-6A51-4108-AA02-DFA0A04FC94B}">
-              <ma14:wrappingTextBoxFlag xmlns:ma14="http://schemas.microsoft.com/office/mac/drawingml/2011/main" xmlns:a14="http://schemas.microsoft.com/office/drawing/2010/main" xmlns:m="http://schemas.openxmlformats.org/officeDocument/2006/math" xmlns="" val="1"/>
+              <ma14:wrappingTextBoxFlag xmlns="" xmlns:m="http://schemas.openxmlformats.org/officeDocument/2006/math" xmlns:a14="http://schemas.microsoft.com/office/drawing/2010/main" xmlns:ma14="http://schemas.microsoft.com/office/mac/drawingml/2011/main" val="1"/>
             </a:ext>
           </a:extLst>
         </p:spPr>

</xml_diff>